<commit_message>
Commit previo a comentar el codigo mañana, además abrá algún cambio más.
</commit_message>
<xml_diff>
--- a/PowerPointFinalCurso.pptx
+++ b/PowerPointFinalCurso.pptx
@@ -2249,8 +2249,8 @@
             <a:defRPr b="1"/>
           </a:pPr>
           <a:r>
-            <a:rPr lang="en-US"/>
-            <a:t>marzo</a:t>
+            <a:rPr lang="en-US" dirty="0"/>
+            <a:t>Marzo</a:t>
           </a:r>
         </a:p>
       </dgm:t>
@@ -2460,7 +2460,7 @@
           </a:r>
           <a:r>
             <a:rPr lang="en-US" dirty="0" err="1"/>
-            <a:t>capetas</a:t>
+            <a:t>carpetas</a:t>
           </a:r>
           <a:r>
             <a:rPr lang="en-US" dirty="0"/>
@@ -3724,8 +3724,8 @@
             <a:defRPr b="1"/>
           </a:pPr>
           <a:r>
-            <a:rPr lang="en-US" sz="2000" kern="1200"/>
-            <a:t>marzo</a:t>
+            <a:rPr lang="en-US" sz="2000" kern="1200" dirty="0"/>
+            <a:t>Marzo</a:t>
           </a:r>
         </a:p>
       </dsp:txBody>
@@ -4345,7 +4345,7 @@
           </a:r>
           <a:r>
             <a:rPr lang="en-US" sz="1500" kern="1200" dirty="0" err="1"/>
-            <a:t>capetas</a:t>
+            <a:t>carpetas</a:t>
           </a:r>
           <a:r>
             <a:rPr lang="en-US" sz="1500" kern="1200" dirty="0"/>
@@ -7562,7 +7562,7 @@
           <a:p>
             <a:fld id="{0DAF61AA-5A98-4049-A93E-477E5505141A}" type="datetimeFigureOut">
               <a:rPr lang="en-US" smtClean="0"/>
-              <a:t>6/13/2024</a:t>
+              <a:t>6/17/2024</a:t>
             </a:fld>
             <a:endParaRPr lang="en-US" dirty="0"/>
           </a:p>
@@ -7760,7 +7760,7 @@
           <a:p>
             <a:fld id="{0DAF61AA-5A98-4049-A93E-477E5505141A}" type="datetimeFigureOut">
               <a:rPr lang="en-US" smtClean="0"/>
-              <a:t>6/13/2024</a:t>
+              <a:t>6/17/2024</a:t>
             </a:fld>
             <a:endParaRPr lang="en-US"/>
           </a:p>
@@ -7968,7 +7968,7 @@
           <a:p>
             <a:fld id="{0DAF61AA-5A98-4049-A93E-477E5505141A}" type="datetimeFigureOut">
               <a:rPr lang="en-US" smtClean="0"/>
-              <a:t>6/13/2024</a:t>
+              <a:t>6/17/2024</a:t>
             </a:fld>
             <a:endParaRPr lang="en-US"/>
           </a:p>
@@ -8166,7 +8166,7 @@
           <a:p>
             <a:fld id="{0DAF61AA-5A98-4049-A93E-477E5505141A}" type="datetimeFigureOut">
               <a:rPr lang="en-US" smtClean="0"/>
-              <a:t>6/13/2024</a:t>
+              <a:t>6/17/2024</a:t>
             </a:fld>
             <a:endParaRPr lang="en-US"/>
           </a:p>
@@ -8441,7 +8441,7 @@
           <a:p>
             <a:fld id="{0DAF61AA-5A98-4049-A93E-477E5505141A}" type="datetimeFigureOut">
               <a:rPr lang="en-US" smtClean="0"/>
-              <a:t>6/13/2024</a:t>
+              <a:t>6/17/2024</a:t>
             </a:fld>
             <a:endParaRPr lang="en-US"/>
           </a:p>
@@ -8706,7 +8706,7 @@
           <a:p>
             <a:fld id="{0DAF61AA-5A98-4049-A93E-477E5505141A}" type="datetimeFigureOut">
               <a:rPr lang="en-US" smtClean="0"/>
-              <a:t>6/13/2024</a:t>
+              <a:t>6/17/2024</a:t>
             </a:fld>
             <a:endParaRPr lang="en-US"/>
           </a:p>
@@ -9118,7 +9118,7 @@
           <a:p>
             <a:fld id="{0DAF61AA-5A98-4049-A93E-477E5505141A}" type="datetimeFigureOut">
               <a:rPr lang="en-US" smtClean="0"/>
-              <a:t>6/13/2024</a:t>
+              <a:t>6/17/2024</a:t>
             </a:fld>
             <a:endParaRPr lang="en-US"/>
           </a:p>
@@ -9259,7 +9259,7 @@
           <a:p>
             <a:fld id="{0DAF61AA-5A98-4049-A93E-477E5505141A}" type="datetimeFigureOut">
               <a:rPr lang="en-US" smtClean="0"/>
-              <a:t>6/13/2024</a:t>
+              <a:t>6/17/2024</a:t>
             </a:fld>
             <a:endParaRPr lang="en-US"/>
           </a:p>
@@ -9372,7 +9372,7 @@
           <a:p>
             <a:fld id="{0DAF61AA-5A98-4049-A93E-477E5505141A}" type="datetimeFigureOut">
               <a:rPr lang="en-US" smtClean="0"/>
-              <a:t>6/13/2024</a:t>
+              <a:t>6/17/2024</a:t>
             </a:fld>
             <a:endParaRPr lang="en-US"/>
           </a:p>
@@ -9683,7 +9683,7 @@
           <a:p>
             <a:fld id="{0DAF61AA-5A98-4049-A93E-477E5505141A}" type="datetimeFigureOut">
               <a:rPr lang="en-US" smtClean="0"/>
-              <a:t>6/13/2024</a:t>
+              <a:t>6/17/2024</a:t>
             </a:fld>
             <a:endParaRPr lang="en-US"/>
           </a:p>
@@ -9974,7 +9974,7 @@
           <a:p>
             <a:fld id="{0DAF61AA-5A98-4049-A93E-477E5505141A}" type="datetimeFigureOut">
               <a:rPr lang="en-US" smtClean="0"/>
-              <a:t>6/13/2024</a:t>
+              <a:t>6/17/2024</a:t>
             </a:fld>
             <a:endParaRPr lang="en-US"/>
           </a:p>
@@ -13662,7 +13662,7 @@
             <a:fld id="{0DAF61AA-5A98-4049-A93E-477E5505141A}" type="datetimeFigureOut">
               <a:rPr lang="en-US" smtClean="0"/>
               <a:pPr/>
-              <a:t>6/13/2024</a:t>
+              <a:t>6/17/2024</a:t>
             </a:fld>
             <a:endParaRPr lang="en-US" dirty="0"/>
           </a:p>
@@ -32427,7 +32427,7 @@
             <p:ph idx="1"/>
             <p:extLst>
               <p:ext uri="{D42A27DB-BD31-4B8C-83A1-F6EECF244321}">
-                <p14:modId xmlns:p14="http://schemas.microsoft.com/office/powerpoint/2010/main" val="1827217355"/>
+                <p14:modId xmlns:p14="http://schemas.microsoft.com/office/powerpoint/2010/main" val="3306263553"/>
               </p:ext>
             </p:extLst>
           </p:nvPr>

</xml_diff>

<commit_message>
Mas cambios a la presentación
</commit_message>
<xml_diff>
--- a/PowerPointFinalCurso.pptx
+++ b/PowerPointFinalCurso.pptx
@@ -41560,7 +41560,31 @@
           <a:p>
             <a:r>
               <a:rPr lang="es-ES" dirty="0"/>
-              <a:t>Spring Mail + OGNL.</a:t>
+              <a:t>Spring Mail + OGNL(</a:t>
+            </a:r>
+            <a:r>
+              <a:rPr lang="es-ES" dirty="0" err="1"/>
+              <a:t>Object-Graph</a:t>
+            </a:r>
+            <a:r>
+              <a:rPr lang="es-ES" dirty="0"/>
+              <a:t> </a:t>
+            </a:r>
+            <a:r>
+              <a:rPr lang="es-ES" dirty="0" err="1"/>
+              <a:t>Navigation</a:t>
+            </a:r>
+            <a:r>
+              <a:rPr lang="es-ES" dirty="0"/>
+              <a:t> </a:t>
+            </a:r>
+            <a:r>
+              <a:rPr lang="es-ES" dirty="0" err="1"/>
+              <a:t>Language</a:t>
+            </a:r>
+            <a:r>
+              <a:rPr lang="es-ES" dirty="0"/>
+              <a:t>).</a:t>
             </a:r>
           </a:p>
           <a:p>

</xml_diff>